<commit_message>
lit review ppt updated
</commit_message>
<xml_diff>
--- a/NeuroTree_lit_review_Donghyun.pptx
+++ b/NeuroTree_lit_review_Donghyun.pptx
@@ -12,7 +12,10 @@
     <p:sldId id="262" r:id="rId6"/>
     <p:sldId id="264" r:id="rId7"/>
     <p:sldId id="263" r:id="rId8"/>
-    <p:sldId id="265" r:id="rId9"/>
+    <p:sldId id="266" r:id="rId9"/>
+    <p:sldId id="267" r:id="rId10"/>
+    <p:sldId id="268" r:id="rId11"/>
+    <p:sldId id="265" r:id="rId12"/>
   </p:sldIdLst>
   <p:sldSz cx="9144000" cy="6858000" type="screen4x3"/>
   <p:notesSz cx="6858000" cy="9144000"/>
@@ -119,12 +122,16 @@
 </p:presentation>
 </file>
 
-<file path=ppt/revisionInfo.xml><?xml version="1.0" encoding="utf-8"?>
-<p1510:revInfo xmlns:a="http://schemas.openxmlformats.org/drawingml/2006/main" xmlns:r="http://schemas.openxmlformats.org/officeDocument/2006/relationships" xmlns:p1510="http://schemas.microsoft.com/office/powerpoint/2015/10/main">
-  <p1510:revLst>
-    <p1510:client id="{06398ADC-39F9-D308-44A6-B77C9CC41F66}" v="6" dt="2019-04-01T19:42:49.273"/>
-  </p1510:revLst>
-</p1510:revInfo>
+<file path=ppt/commentAuthors.xml><?xml version="1.0" encoding="utf-8"?>
+<p:cmAuthorLst xmlns:a="http://schemas.openxmlformats.org/drawingml/2006/main" xmlns:r="http://schemas.openxmlformats.org/officeDocument/2006/relationships" xmlns:p="http://schemas.openxmlformats.org/presentationml/2006/main">
+  <p:cmAuthor id="1" name="Donghyun Kang" initials="DK" lastIdx="5" clrIdx="0">
+    <p:extLst>
+      <p:ext uri="{19B8F6BF-5375-455C-9EA6-DF929625EA0E}">
+        <p15:presenceInfo xmlns:p15="http://schemas.microsoft.com/office/powerpoint/2012/main" userId="Donghyun Kang" providerId="None"/>
+      </p:ext>
+    </p:extLst>
+  </p:cmAuthor>
+</p:cmAuthorLst>
 </file>
 
 <file path=ppt/slideLayouts/slideLayout1.xml><?xml version="1.0" encoding="utf-8"?>
@@ -256,7 +263,7 @@
           <a:p>
             <a:fld id="{2566825D-2B69-4989-8861-A6901ABADB6C}" type="datetimeFigureOut">
               <a:rPr lang="ko-KR" altLang="en-US" smtClean="0"/>
-              <a:t>2019-04-01</a:t>
+              <a:t>2019-04-03</a:t>
             </a:fld>
             <a:endParaRPr lang="ko-KR" altLang="en-US"/>
           </a:p>
@@ -424,7 +431,7 @@
           <a:p>
             <a:fld id="{2566825D-2B69-4989-8861-A6901ABADB6C}" type="datetimeFigureOut">
               <a:rPr lang="ko-KR" altLang="en-US" smtClean="0"/>
-              <a:t>2019-04-01</a:t>
+              <a:t>2019-04-03</a:t>
             </a:fld>
             <a:endParaRPr lang="ko-KR" altLang="en-US"/>
           </a:p>
@@ -602,7 +609,7 @@
           <a:p>
             <a:fld id="{2566825D-2B69-4989-8861-A6901ABADB6C}" type="datetimeFigureOut">
               <a:rPr lang="ko-KR" altLang="en-US" smtClean="0"/>
-              <a:t>2019-04-01</a:t>
+              <a:t>2019-04-03</a:t>
             </a:fld>
             <a:endParaRPr lang="ko-KR" altLang="en-US"/>
           </a:p>
@@ -770,7 +777,7 @@
           <a:p>
             <a:fld id="{2566825D-2B69-4989-8861-A6901ABADB6C}" type="datetimeFigureOut">
               <a:rPr lang="ko-KR" altLang="en-US" smtClean="0"/>
-              <a:t>2019-04-01</a:t>
+              <a:t>2019-04-03</a:t>
             </a:fld>
             <a:endParaRPr lang="ko-KR" altLang="en-US"/>
           </a:p>
@@ -1015,7 +1022,7 @@
           <a:p>
             <a:fld id="{2566825D-2B69-4989-8861-A6901ABADB6C}" type="datetimeFigureOut">
               <a:rPr lang="ko-KR" altLang="en-US" smtClean="0"/>
-              <a:t>2019-04-01</a:t>
+              <a:t>2019-04-03</a:t>
             </a:fld>
             <a:endParaRPr lang="ko-KR" altLang="en-US"/>
           </a:p>
@@ -1244,7 +1251,7 @@
           <a:p>
             <a:fld id="{2566825D-2B69-4989-8861-A6901ABADB6C}" type="datetimeFigureOut">
               <a:rPr lang="ko-KR" altLang="en-US" smtClean="0"/>
-              <a:t>2019-04-01</a:t>
+              <a:t>2019-04-03</a:t>
             </a:fld>
             <a:endParaRPr lang="ko-KR" altLang="en-US"/>
           </a:p>
@@ -1608,7 +1615,7 @@
           <a:p>
             <a:fld id="{2566825D-2B69-4989-8861-A6901ABADB6C}" type="datetimeFigureOut">
               <a:rPr lang="ko-KR" altLang="en-US" smtClean="0"/>
-              <a:t>2019-04-01</a:t>
+              <a:t>2019-04-03</a:t>
             </a:fld>
             <a:endParaRPr lang="ko-KR" altLang="en-US"/>
           </a:p>
@@ -1725,7 +1732,7 @@
           <a:p>
             <a:fld id="{2566825D-2B69-4989-8861-A6901ABADB6C}" type="datetimeFigureOut">
               <a:rPr lang="ko-KR" altLang="en-US" smtClean="0"/>
-              <a:t>2019-04-01</a:t>
+              <a:t>2019-04-03</a:t>
             </a:fld>
             <a:endParaRPr lang="ko-KR" altLang="en-US"/>
           </a:p>
@@ -1820,7 +1827,7 @@
           <a:p>
             <a:fld id="{2566825D-2B69-4989-8861-A6901ABADB6C}" type="datetimeFigureOut">
               <a:rPr lang="ko-KR" altLang="en-US" smtClean="0"/>
-              <a:t>2019-04-01</a:t>
+              <a:t>2019-04-03</a:t>
             </a:fld>
             <a:endParaRPr lang="ko-KR" altLang="en-US"/>
           </a:p>
@@ -2095,7 +2102,7 @@
           <a:p>
             <a:fld id="{2566825D-2B69-4989-8861-A6901ABADB6C}" type="datetimeFigureOut">
               <a:rPr lang="ko-KR" altLang="en-US" smtClean="0"/>
-              <a:t>2019-04-01</a:t>
+              <a:t>2019-04-03</a:t>
             </a:fld>
             <a:endParaRPr lang="ko-KR" altLang="en-US"/>
           </a:p>
@@ -2347,7 +2354,7 @@
           <a:p>
             <a:fld id="{2566825D-2B69-4989-8861-A6901ABADB6C}" type="datetimeFigureOut">
               <a:rPr lang="ko-KR" altLang="en-US" smtClean="0"/>
-              <a:t>2019-04-01</a:t>
+              <a:t>2019-04-03</a:t>
             </a:fld>
             <a:endParaRPr lang="ko-KR" altLang="en-US"/>
           </a:p>
@@ -2558,7 +2565,7 @@
           <a:p>
             <a:fld id="{2566825D-2B69-4989-8861-A6901ABADB6C}" type="datetimeFigureOut">
               <a:rPr lang="ko-KR" altLang="en-US" smtClean="0"/>
-              <a:t>2019-04-01</a:t>
+              <a:t>2019-04-03</a:t>
             </a:fld>
             <a:endParaRPr lang="ko-KR" altLang="en-US"/>
           </a:p>
@@ -3065,6 +3072,367 @@
 </p:sld>
 </file>
 
+<file path=ppt/slides/slide10.xml><?xml version="1.0" encoding="utf-8"?>
+<p:sld xmlns:a="http://schemas.openxmlformats.org/drawingml/2006/main" xmlns:r="http://schemas.openxmlformats.org/officeDocument/2006/relationships" xmlns:p="http://schemas.openxmlformats.org/presentationml/2006/main">
+  <p:cSld>
+    <p:spTree>
+      <p:nvGrpSpPr>
+        <p:cNvPr id="1" name=""/>
+        <p:cNvGrpSpPr/>
+        <p:nvPr/>
+      </p:nvGrpSpPr>
+      <p:grpSpPr>
+        <a:xfrm>
+          <a:off x="0" y="0"/>
+          <a:ext cx="0" cy="0"/>
+          <a:chOff x="0" y="0"/>
+          <a:chExt cx="0" cy="0"/>
+        </a:xfrm>
+      </p:grpSpPr>
+      <p:sp>
+        <p:nvSpPr>
+          <p:cNvPr id="2" name="직사각형 1"/>
+          <p:cNvSpPr/>
+          <p:nvPr/>
+        </p:nvSpPr>
+        <p:spPr>
+          <a:xfrm>
+            <a:off x="537437" y="6199832"/>
+            <a:ext cx="8580782" cy="415498"/>
+          </a:xfrm>
+          <a:prstGeom prst="rect">
+            <a:avLst/>
+          </a:prstGeom>
+        </p:spPr>
+        <p:txBody>
+          <a:bodyPr wrap="square" anchor="t">
+            <a:spAutoFit/>
+          </a:bodyPr>
+          <a:lstStyle/>
+          <a:p>
+            <a:r>
+              <a:rPr lang="en-US" sz="1050" dirty="0" err="1">
+                <a:latin typeface="Arial"/>
+                <a:cs typeface="Arial"/>
+              </a:rPr>
+              <a:t>Chariker</a:t>
+            </a:r>
+            <a:r>
+              <a:rPr lang="en-US" sz="1050" dirty="0">
+                <a:latin typeface="Arial"/>
+                <a:cs typeface="Arial"/>
+              </a:rPr>
+              <a:t>, Julia H., </a:t>
+            </a:r>
+            <a:r>
+              <a:rPr lang="en-US" sz="1050" dirty="0" err="1">
+                <a:latin typeface="Arial"/>
+                <a:cs typeface="Arial"/>
+              </a:rPr>
+              <a:t>Yihang</a:t>
+            </a:r>
+            <a:r>
+              <a:rPr lang="en-US" sz="1050" dirty="0">
+                <a:latin typeface="Arial"/>
+                <a:cs typeface="Arial"/>
+              </a:rPr>
+              <a:t> Zhang, John R. Pani, and Eric C. </a:t>
+            </a:r>
+            <a:r>
+              <a:rPr lang="en-US" sz="1050" dirty="0" err="1">
+                <a:latin typeface="Arial"/>
+                <a:cs typeface="Arial"/>
+              </a:rPr>
+              <a:t>Rouchka</a:t>
+            </a:r>
+            <a:r>
+              <a:rPr lang="en-US" sz="1050" dirty="0">
+                <a:latin typeface="Arial"/>
+                <a:cs typeface="Arial"/>
+              </a:rPr>
+              <a:t>. "Identification of successful mentoring communities using network-based analysis of mentor–mentee relationships across Nobel laureates." </a:t>
+            </a:r>
+            <a:r>
+              <a:rPr lang="en-US" sz="1050" i="1" dirty="0" err="1">
+                <a:latin typeface="Arial"/>
+                <a:cs typeface="Arial"/>
+              </a:rPr>
+              <a:t>Scientometrics</a:t>
+            </a:r>
+            <a:r>
+              <a:rPr lang="en-US" sz="1050" dirty="0">
+                <a:latin typeface="Arial"/>
+                <a:cs typeface="Arial"/>
+              </a:rPr>
+              <a:t> 111, no. 3 (2017): 1733-1749.</a:t>
+            </a:r>
+            <a:endParaRPr lang="ko-KR" dirty="0"/>
+          </a:p>
+        </p:txBody>
+      </p:sp>
+      <p:sp>
+        <p:nvSpPr>
+          <p:cNvPr id="5" name="TextBox 4">
+            <a:extLst>
+              <a:ext uri="{FF2B5EF4-FFF2-40B4-BE49-F238E27FC236}">
+                <a16:creationId xmlns:a16="http://schemas.microsoft.com/office/drawing/2014/main" id="{9284D01B-CBC3-43FE-9A5E-6C45C0CA2498}"/>
+              </a:ext>
+            </a:extLst>
+          </p:cNvPr>
+          <p:cNvSpPr txBox="1"/>
+          <p:nvPr/>
+        </p:nvSpPr>
+        <p:spPr>
+          <a:xfrm>
+            <a:off x="863566" y="464945"/>
+            <a:ext cx="7275882" cy="3046988"/>
+          </a:xfrm>
+          <a:prstGeom prst="rect">
+            <a:avLst/>
+          </a:prstGeom>
+        </p:spPr>
+        <p:txBody>
+          <a:bodyPr rot="0" spcFirstLastPara="0" vertOverflow="overflow" horzOverflow="overflow" vert="horz" wrap="square" lIns="91440" tIns="45720" rIns="91440" bIns="45720" numCol="1" spcCol="0" rtlCol="0" fromWordArt="0" anchor="t" anchorCtr="0" forceAA="0" compatLnSpc="1">
+            <a:prstTxWarp prst="textNoShape">
+              <a:avLst/>
+            </a:prstTxWarp>
+            <a:spAutoFit/>
+          </a:bodyPr>
+          <a:lstStyle/>
+          <a:p>
+            <a:pPr marL="285750" indent="-285750">
+              <a:buFontTx/>
+              <a:buChar char="-"/>
+            </a:pPr>
+            <a:r>
+              <a:rPr lang="en-US" altLang="ko-KR" sz="1600" dirty="0">
+                <a:ea typeface="맑은 고딕"/>
+              </a:rPr>
+              <a:t>When all non-Nobel laureates were removed, 142 individuals have at least one connection with each other. The heterogeneity of fields are measured by eq. (1) on p. 1738. (maybe IQV would be a better measure…)</a:t>
+            </a:r>
+          </a:p>
+          <a:p>
+            <a:pPr marL="285750" indent="-285750">
+              <a:buFontTx/>
+              <a:buChar char="-"/>
+            </a:pPr>
+            <a:endParaRPr lang="en-US" altLang="ko-KR" sz="1600" dirty="0">
+              <a:ea typeface="맑은 고딕"/>
+            </a:endParaRPr>
+          </a:p>
+          <a:p>
+            <a:pPr marL="285750" indent="-285750">
+              <a:buFontTx/>
+              <a:buChar char="-"/>
+            </a:pPr>
+            <a:r>
+              <a:rPr lang="en-US" altLang="ko-KR" sz="1600" dirty="0">
+                <a:ea typeface="맑은 고딕"/>
+              </a:rPr>
+              <a:t>The result shows a significant positive relation between heterogeneity and the number of Nobel Laureates in subgraphs.</a:t>
+            </a:r>
+          </a:p>
+          <a:p>
+            <a:endParaRPr lang="en-US" altLang="ko-KR" sz="1600" dirty="0">
+              <a:ea typeface="맑은 고딕"/>
+            </a:endParaRPr>
+          </a:p>
+          <a:p>
+            <a:pPr marL="742950" lvl="1" indent="-285750">
+              <a:buFont typeface="Arial" panose="020B0604020202020204" pitchFamily="34" charset="0"/>
+              <a:buChar char="•"/>
+            </a:pPr>
+            <a:endParaRPr lang="en-US" altLang="ko-KR" sz="1600" dirty="0">
+              <a:ea typeface="맑은 고딕"/>
+            </a:endParaRPr>
+          </a:p>
+          <a:p>
+            <a:pPr marL="742950" lvl="1" indent="-285750">
+              <a:buFont typeface="Arial" panose="020B0604020202020204" pitchFamily="34" charset="0"/>
+              <a:buChar char="•"/>
+            </a:pPr>
+            <a:endParaRPr lang="en-US" altLang="ko-KR" sz="1600" dirty="0">
+              <a:ea typeface="맑은 고딕"/>
+            </a:endParaRPr>
+          </a:p>
+          <a:p>
+            <a:pPr marL="742950" lvl="1" indent="-285750">
+              <a:buFont typeface="Arial" panose="020B0604020202020204" pitchFamily="34" charset="0"/>
+              <a:buChar char="•"/>
+            </a:pPr>
+            <a:endParaRPr lang="en-US" altLang="ko-KR" sz="1600" dirty="0">
+              <a:ea typeface="맑은 고딕"/>
+            </a:endParaRPr>
+          </a:p>
+          <a:p>
+            <a:r>
+              <a:rPr lang="en-US" altLang="ko-KR" sz="1600" dirty="0">
+                <a:ea typeface="맑은 고딕"/>
+              </a:rPr>
+              <a:t>	</a:t>
+            </a:r>
+          </a:p>
+        </p:txBody>
+      </p:sp>
+      <p:pic>
+        <p:nvPicPr>
+          <p:cNvPr id="6" name="그림 5">
+            <a:extLst>
+              <a:ext uri="{FF2B5EF4-FFF2-40B4-BE49-F238E27FC236}">
+                <a16:creationId xmlns:a16="http://schemas.microsoft.com/office/drawing/2014/main" id="{A38DE838-51C0-469E-9EEE-CBC6A6E4551A}"/>
+              </a:ext>
+            </a:extLst>
+          </p:cNvPr>
+          <p:cNvPicPr>
+            <a:picLocks noChangeAspect="1"/>
+          </p:cNvPicPr>
+          <p:nvPr/>
+        </p:nvPicPr>
+        <p:blipFill>
+          <a:blip r:embed="rId2"/>
+          <a:stretch>
+            <a:fillRect/>
+          </a:stretch>
+        </p:blipFill>
+        <p:spPr>
+          <a:xfrm>
+            <a:off x="1864604" y="2352384"/>
+            <a:ext cx="5414792" cy="3667416"/>
+          </a:xfrm>
+          <a:prstGeom prst="rect">
+            <a:avLst/>
+          </a:prstGeom>
+          <a:ln>
+            <a:solidFill>
+              <a:schemeClr val="tx1"/>
+            </a:solidFill>
+          </a:ln>
+        </p:spPr>
+      </p:pic>
+    </p:spTree>
+    <p:extLst>
+      <p:ext uri="{BB962C8B-B14F-4D97-AF65-F5344CB8AC3E}">
+        <p14:creationId xmlns:p14="http://schemas.microsoft.com/office/powerpoint/2010/main" val="57051800"/>
+      </p:ext>
+    </p:extLst>
+  </p:cSld>
+  <p:clrMapOvr>
+    <a:masterClrMapping/>
+  </p:clrMapOvr>
+</p:sld>
+</file>
+
+<file path=ppt/slides/slide11.xml><?xml version="1.0" encoding="utf-8"?>
+<p:sld xmlns:a="http://schemas.openxmlformats.org/drawingml/2006/main" xmlns:r="http://schemas.openxmlformats.org/officeDocument/2006/relationships" xmlns:p="http://schemas.openxmlformats.org/presentationml/2006/main">
+  <p:cSld>
+    <p:spTree>
+      <p:nvGrpSpPr>
+        <p:cNvPr id="1" name=""/>
+        <p:cNvGrpSpPr/>
+        <p:nvPr/>
+      </p:nvGrpSpPr>
+      <p:grpSpPr>
+        <a:xfrm>
+          <a:off x="0" y="0"/>
+          <a:ext cx="0" cy="0"/>
+          <a:chOff x="0" y="0"/>
+          <a:chExt cx="0" cy="0"/>
+        </a:xfrm>
+      </p:grpSpPr>
+      <p:sp>
+        <p:nvSpPr>
+          <p:cNvPr id="2" name="직사각형 1"/>
+          <p:cNvSpPr/>
+          <p:nvPr/>
+        </p:nvSpPr>
+        <p:spPr>
+          <a:xfrm>
+            <a:off x="537437" y="6199832"/>
+            <a:ext cx="8580782" cy="415498"/>
+          </a:xfrm>
+          <a:prstGeom prst="rect">
+            <a:avLst/>
+          </a:prstGeom>
+        </p:spPr>
+        <p:txBody>
+          <a:bodyPr wrap="square" anchor="t">
+            <a:spAutoFit/>
+          </a:bodyPr>
+          <a:lstStyle/>
+          <a:p>
+            <a:r>
+              <a:rPr lang="en-US" sz="1050" dirty="0">
+                <a:latin typeface="Arial"/>
+                <a:cs typeface="Arial"/>
+              </a:rPr>
+              <a:t>Malmgren, R. Dean, Julio M. Ottino, and Luís A. Nunes Amaral. "The role of mentorship in protégé performance." </a:t>
+            </a:r>
+            <a:r>
+              <a:rPr lang="en-US" sz="1050" i="1" dirty="0">
+                <a:latin typeface="Arial"/>
+                <a:cs typeface="Arial"/>
+              </a:rPr>
+              <a:t>Nature</a:t>
+            </a:r>
+            <a:r>
+              <a:rPr lang="en-US" sz="1050" dirty="0">
+                <a:latin typeface="Arial"/>
+                <a:cs typeface="Arial"/>
+              </a:rPr>
+              <a:t> 465, no. 7298 (2010): 622.</a:t>
+            </a:r>
+            <a:endParaRPr lang="ko-KR" dirty="0"/>
+          </a:p>
+        </p:txBody>
+      </p:sp>
+      <p:pic>
+        <p:nvPicPr>
+          <p:cNvPr id="5" name="그림 5">
+            <a:extLst>
+              <a:ext uri="{FF2B5EF4-FFF2-40B4-BE49-F238E27FC236}">
+                <a16:creationId xmlns:a16="http://schemas.microsoft.com/office/drawing/2014/main" id="{7C8E00FC-F77E-478F-9802-55B3B4036D15}"/>
+              </a:ext>
+            </a:extLst>
+          </p:cNvPr>
+          <p:cNvPicPr>
+            <a:picLocks noChangeAspect="1"/>
+          </p:cNvPicPr>
+          <p:nvPr/>
+        </p:nvPicPr>
+        <p:blipFill>
+          <a:blip r:embed="rId2"/>
+          <a:stretch>
+            <a:fillRect/>
+          </a:stretch>
+        </p:blipFill>
+        <p:spPr>
+          <a:xfrm>
+            <a:off x="1582697" y="971054"/>
+            <a:ext cx="6181805" cy="1911219"/>
+          </a:xfrm>
+          <a:prstGeom prst="rect">
+            <a:avLst/>
+          </a:prstGeom>
+          <a:ln>
+            <a:solidFill>
+              <a:schemeClr val="tx1"/>
+            </a:solidFill>
+          </a:ln>
+        </p:spPr>
+      </p:pic>
+    </p:spTree>
+    <p:extLst>
+      <p:ext uri="{BB962C8B-B14F-4D97-AF65-F5344CB8AC3E}">
+        <p14:creationId xmlns:p14="http://schemas.microsoft.com/office/powerpoint/2010/main" val="784926822"/>
+      </p:ext>
+    </p:extLst>
+  </p:cSld>
+  <p:clrMapOvr>
+    <a:masterClrMapping/>
+  </p:clrMapOvr>
+</p:sld>
+</file>
+
 <file path=ppt/slides/slide2.xml><?xml version="1.0" encoding="utf-8"?>
 <p:sld xmlns:a="http://schemas.openxmlformats.org/drawingml/2006/main" xmlns:r="http://schemas.openxmlformats.org/officeDocument/2006/relationships" xmlns:p="http://schemas.openxmlformats.org/presentationml/2006/main">
   <p:cSld>
@@ -3444,6 +3812,11 @@
           <a:prstGeom prst="rect">
             <a:avLst/>
           </a:prstGeom>
+          <a:ln>
+            <a:solidFill>
+              <a:schemeClr val="tx1"/>
+            </a:solidFill>
+          </a:ln>
         </p:spPr>
       </p:pic>
       <p:sp>
@@ -3996,6 +4369,11 @@
           <a:prstGeom prst="rect">
             <a:avLst/>
           </a:prstGeom>
+          <a:ln>
+            <a:solidFill>
+              <a:schemeClr val="tx1"/>
+            </a:solidFill>
+          </a:ln>
         </p:spPr>
       </p:pic>
       <p:sp>
@@ -4296,6 +4674,11 @@
           <a:prstGeom prst="rect">
             <a:avLst/>
           </a:prstGeom>
+          <a:ln>
+            <a:solidFill>
+              <a:schemeClr val="tx1"/>
+            </a:solidFill>
+          </a:ln>
         </p:spPr>
       </p:pic>
     </p:spTree>
@@ -4469,6 +4852,11 @@
           <a:prstGeom prst="rect">
             <a:avLst/>
           </a:prstGeom>
+          <a:ln>
+            <a:solidFill>
+              <a:schemeClr val="tx1"/>
+            </a:solidFill>
+          </a:ln>
         </p:spPr>
       </p:pic>
       <p:sp>
@@ -4486,7 +4874,7 @@
         <p:spPr>
           <a:xfrm>
             <a:off x="991241" y="4535499"/>
-            <a:ext cx="6863761" cy="954107"/>
+            <a:ext cx="7289193" cy="1323439"/>
           </a:xfrm>
           <a:prstGeom prst="rect">
             <a:avLst/>
@@ -4501,168 +4889,36 @@
           </a:bodyPr>
           <a:lstStyle/>
           <a:p>
-            <a:r>
-              <a:rPr lang="ko-KR" altLang="en-US" sz="1400" dirty="0">
-                <a:ea typeface="맑은 고딕"/>
-              </a:rPr>
-              <a:t>- </a:t>
-            </a:r>
-            <a:r>
-              <a:rPr lang="ko-KR" altLang="en-US" sz="1400" dirty="0" err="1">
-                <a:ea typeface="맑은 고딕"/>
-              </a:rPr>
-              <a:t>We</a:t>
-            </a:r>
-            <a:r>
-              <a:rPr lang="ko-KR" altLang="en-US" sz="1400" dirty="0">
-                <a:ea typeface="맑은 고딕"/>
-              </a:rPr>
-              <a:t> </a:t>
-            </a:r>
-            <a:r>
-              <a:rPr lang="ko-KR" altLang="en-US" sz="1400" dirty="0" err="1">
-                <a:ea typeface="맑은 고딕"/>
-              </a:rPr>
-              <a:t>can</a:t>
-            </a:r>
-            <a:r>
-              <a:rPr lang="ko-KR" altLang="en-US" sz="1400" dirty="0">
-                <a:ea typeface="맑은 고딕"/>
-              </a:rPr>
-              <a:t> </a:t>
-            </a:r>
-            <a:r>
-              <a:rPr lang="ko-KR" altLang="en-US" sz="1400" dirty="0" err="1">
-                <a:ea typeface="맑은 고딕"/>
-              </a:rPr>
-              <a:t>basically</a:t>
-            </a:r>
-            <a:r>
-              <a:rPr lang="ko-KR" altLang="en-US" sz="1400" dirty="0">
-                <a:ea typeface="맑은 고딕"/>
-              </a:rPr>
-              <a:t> </a:t>
-            </a:r>
-            <a:r>
-              <a:rPr lang="ko-KR" altLang="en-US" sz="1400" dirty="0" err="1">
-                <a:ea typeface="맑은 고딕"/>
-              </a:rPr>
-              <a:t>identify</a:t>
-            </a:r>
-            <a:r>
-              <a:rPr lang="ko-KR" altLang="en-US" sz="1400" dirty="0">
-                <a:ea typeface="맑은 고딕"/>
-              </a:rPr>
-              <a:t> </a:t>
-            </a:r>
-            <a:r>
-              <a:rPr lang="ko-KR" altLang="en-US" sz="1400" dirty="0" err="1">
-                <a:ea typeface="맑은 고딕"/>
-              </a:rPr>
-              <a:t>successful</a:t>
-            </a:r>
-            <a:r>
-              <a:rPr lang="ko-KR" altLang="en-US" sz="1400" dirty="0">
-                <a:ea typeface="맑은 고딕"/>
-              </a:rPr>
-              <a:t> </a:t>
-            </a:r>
-            <a:r>
-              <a:rPr lang="ko-KR" altLang="en-US" sz="1400" dirty="0" err="1">
-                <a:ea typeface="맑은 고딕"/>
-              </a:rPr>
-              <a:t>communities</a:t>
-            </a:r>
-            <a:r>
-              <a:rPr lang="ko-KR" altLang="en-US" sz="1400" dirty="0">
-                <a:ea typeface="맑은 고딕"/>
-              </a:rPr>
-              <a:t> of </a:t>
-            </a:r>
-            <a:r>
-              <a:rPr lang="ko-KR" altLang="en-US" sz="1400" dirty="0" err="1">
-                <a:ea typeface="맑은 고딕"/>
-              </a:rPr>
-              <a:t>scientists</a:t>
-            </a:r>
-            <a:r>
-              <a:rPr lang="ko-KR" altLang="en-US" sz="1400" dirty="0">
-                <a:ea typeface="맑은 고딕"/>
-              </a:rPr>
-              <a:t> </a:t>
-            </a:r>
-            <a:r>
-              <a:rPr lang="ko-KR" altLang="en-US" sz="1400" dirty="0" err="1">
-                <a:ea typeface="맑은 고딕"/>
-              </a:rPr>
-              <a:t>in</a:t>
-            </a:r>
-            <a:r>
-              <a:rPr lang="ko-KR" altLang="en-US" sz="1400" dirty="0">
-                <a:ea typeface="맑은 고딕"/>
-              </a:rPr>
-              <a:t> </a:t>
-            </a:r>
-            <a:r>
-              <a:rPr lang="ko-KR" altLang="en-US" sz="1400" dirty="0" err="1">
-                <a:ea typeface="맑은 고딕"/>
-              </a:rPr>
-              <a:t>which</a:t>
-            </a:r>
-            <a:r>
-              <a:rPr lang="ko-KR" altLang="en-US" sz="1400" dirty="0">
-                <a:ea typeface="맑은 고딕"/>
-              </a:rPr>
-              <a:t> </a:t>
-            </a:r>
-            <a:r>
-              <a:rPr lang="ko-KR" altLang="en-US" sz="1400" dirty="0" err="1">
-                <a:ea typeface="맑은 고딕"/>
-              </a:rPr>
-              <a:t>produce</a:t>
-            </a:r>
-            <a:r>
-              <a:rPr lang="ko-KR" altLang="en-US" sz="1400" dirty="0">
-                <a:ea typeface="맑은 고딕"/>
-              </a:rPr>
-              <a:t> </a:t>
-            </a:r>
-            <a:r>
-              <a:rPr lang="ko-KR" altLang="en-US" sz="1400" dirty="0" err="1">
-                <a:ea typeface="맑은 고딕"/>
-              </a:rPr>
-              <a:t>Nobel</a:t>
-            </a:r>
-            <a:r>
-              <a:rPr lang="ko-KR" altLang="en-US" sz="1400" dirty="0">
-                <a:ea typeface="맑은 고딕"/>
-              </a:rPr>
-              <a:t> </a:t>
-            </a:r>
-            <a:r>
-              <a:rPr lang="ko-KR" altLang="en-US" sz="1400" dirty="0" err="1">
-                <a:ea typeface="맑은 고딕"/>
-              </a:rPr>
-              <a:t>laureates</a:t>
-            </a:r>
-            <a:r>
-              <a:rPr lang="ko-KR" altLang="en-US" sz="1400" dirty="0">
-                <a:ea typeface="맑은 고딕"/>
-              </a:rPr>
-              <a:t>. </a:t>
-            </a:r>
-          </a:p>
-          <a:p>
-            <a:endParaRPr lang="ko-KR" altLang="en-US" sz="1400" dirty="0">
+            <a:pPr marL="285750" indent="-285750">
+              <a:buFontTx/>
+              <a:buChar char="-"/>
+            </a:pPr>
+            <a:r>
+              <a:rPr lang="en-US" altLang="ko-KR" sz="1600" dirty="0">
+                <a:ea typeface="맑은 고딕"/>
+              </a:rPr>
+              <a:t>Argument: We can basically identify successful scientific communities which produced Nobel Prize winners in terms of doctoral mentor-mentee relationships.</a:t>
+            </a:r>
+          </a:p>
+          <a:p>
+            <a:pPr marL="285750" indent="-285750">
+              <a:buFontTx/>
+              <a:buChar char="-"/>
+            </a:pPr>
+            <a:endParaRPr lang="en-US" altLang="ko-KR" sz="1600" dirty="0">
               <a:ea typeface="맑은 고딕"/>
             </a:endParaRPr>
           </a:p>
           <a:p>
-            <a:r>
-              <a:rPr lang="ko-KR" altLang="en-US" sz="1400" dirty="0">
-                <a:ea typeface="맑은 고딕"/>
-              </a:rPr>
-              <a:t>- </a:t>
+            <a:pPr marL="285750" indent="-285750">
+              <a:buFontTx/>
+              <a:buChar char="-"/>
+            </a:pPr>
+            <a:r>
+              <a:rPr lang="en-US" altLang="ko-KR" sz="1600" dirty="0">
+                <a:ea typeface="맑은 고딕"/>
+              </a:rPr>
+              <a:t>This piece only focuses on network structure of Nobel Prize winners. </a:t>
             </a:r>
           </a:p>
         </p:txBody>
@@ -4751,36 +5007,561 @@
           <a:lstStyle/>
           <a:p>
             <a:r>
+              <a:rPr lang="en-US" sz="1050" dirty="0" err="1">
+                <a:latin typeface="Arial"/>
+                <a:cs typeface="Arial"/>
+              </a:rPr>
+              <a:t>Chariker</a:t>
+            </a:r>
+            <a:r>
               <a:rPr lang="en-US" sz="1050" dirty="0">
                 <a:latin typeface="Arial"/>
                 <a:cs typeface="Arial"/>
               </a:rPr>
-              <a:t>Malmgren, R. Dean, Julio M. Ottino, and Luís A. Nunes Amaral. "The role of mentorship in protégé performance." </a:t>
-            </a:r>
-            <a:r>
-              <a:rPr lang="en-US" sz="1050" i="1" dirty="0">
-                <a:latin typeface="Arial"/>
-                <a:cs typeface="Arial"/>
-              </a:rPr>
-              <a:t>Nature</a:t>
+              <a:t>, Julia H., </a:t>
+            </a:r>
+            <a:r>
+              <a:rPr lang="en-US" sz="1050" dirty="0" err="1">
+                <a:latin typeface="Arial"/>
+                <a:cs typeface="Arial"/>
+              </a:rPr>
+              <a:t>Yihang</a:t>
             </a:r>
             <a:r>
               <a:rPr lang="en-US" sz="1050" dirty="0">
                 <a:latin typeface="Arial"/>
                 <a:cs typeface="Arial"/>
               </a:rPr>
-              <a:t> 465, no. 7298 (2010): 622.</a:t>
+              <a:t> Zhang, John R. Pani, and Eric C. </a:t>
+            </a:r>
+            <a:r>
+              <a:rPr lang="en-US" sz="1050" dirty="0" err="1">
+                <a:latin typeface="Arial"/>
+                <a:cs typeface="Arial"/>
+              </a:rPr>
+              <a:t>Rouchka</a:t>
+            </a:r>
+            <a:r>
+              <a:rPr lang="en-US" sz="1050" dirty="0">
+                <a:latin typeface="Arial"/>
+                <a:cs typeface="Arial"/>
+              </a:rPr>
+              <a:t>. "Identification of successful mentoring communities using network-based analysis of mentor–mentee relationships across Nobel laureates." </a:t>
+            </a:r>
+            <a:r>
+              <a:rPr lang="en-US" sz="1050" i="1" dirty="0" err="1">
+                <a:latin typeface="Arial"/>
+                <a:cs typeface="Arial"/>
+              </a:rPr>
+              <a:t>Scientometrics</a:t>
+            </a:r>
+            <a:r>
+              <a:rPr lang="en-US" sz="1050" dirty="0">
+                <a:latin typeface="Arial"/>
+                <a:cs typeface="Arial"/>
+              </a:rPr>
+              <a:t> 111, no. 3 (2017): 1733-1749.</a:t>
             </a:r>
             <a:endParaRPr lang="ko-KR" dirty="0"/>
+          </a:p>
+        </p:txBody>
+      </p:sp>
+      <p:sp>
+        <p:nvSpPr>
+          <p:cNvPr id="9" name="TextBox 8">
+            <a:extLst>
+              <a:ext uri="{FF2B5EF4-FFF2-40B4-BE49-F238E27FC236}">
+                <a16:creationId xmlns:a16="http://schemas.microsoft.com/office/drawing/2014/main" id="{9B910E6F-AF4F-4CD2-8ADB-C356C34E3DCA}"/>
+              </a:ext>
+            </a:extLst>
+          </p:cNvPr>
+          <p:cNvSpPr txBox="1"/>
+          <p:nvPr/>
+        </p:nvSpPr>
+        <p:spPr>
+          <a:xfrm>
+            <a:off x="863566" y="464945"/>
+            <a:ext cx="7275882" cy="6494085"/>
+          </a:xfrm>
+          <a:prstGeom prst="rect">
+            <a:avLst/>
+          </a:prstGeom>
+        </p:spPr>
+        <p:txBody>
+          <a:bodyPr rot="0" spcFirstLastPara="0" vertOverflow="overflow" horzOverflow="overflow" vert="horz" wrap="square" lIns="91440" tIns="45720" rIns="91440" bIns="45720" numCol="1" spcCol="0" rtlCol="0" fromWordArt="0" anchor="t" anchorCtr="0" forceAA="0" compatLnSpc="1">
+            <a:prstTxWarp prst="textNoShape">
+              <a:avLst/>
+            </a:prstTxWarp>
+            <a:spAutoFit/>
+          </a:bodyPr>
+          <a:lstStyle/>
+          <a:p>
+            <a:pPr marL="285750" indent="-285750">
+              <a:buFontTx/>
+              <a:buChar char="-"/>
+            </a:pPr>
+            <a:r>
+              <a:rPr lang="en-US" altLang="ko-KR" sz="1600" dirty="0">
+                <a:ea typeface="맑은 고딕"/>
+              </a:rPr>
+              <a:t>Sociological background</a:t>
+            </a:r>
+          </a:p>
+          <a:p>
+            <a:pPr marL="742950" lvl="1" indent="-285750">
+              <a:buFont typeface="Arial" panose="020B0604020202020204" pitchFamily="34" charset="0"/>
+              <a:buChar char="•"/>
+            </a:pPr>
+            <a:r>
+              <a:rPr lang="en-US" altLang="ko-KR" sz="1600" dirty="0">
+                <a:ea typeface="맑은 고딕"/>
+              </a:rPr>
+              <a:t>Zuckerman (1977): “pattern of assortative collaboration”  </a:t>
+            </a:r>
+          </a:p>
+          <a:p>
+            <a:pPr marL="285750" indent="-285750">
+              <a:buFontTx/>
+              <a:buChar char="-"/>
+            </a:pPr>
+            <a:endParaRPr lang="en-US" altLang="ko-KR" sz="1600" dirty="0">
+              <a:ea typeface="맑은 고딕"/>
+            </a:endParaRPr>
+          </a:p>
+          <a:p>
+            <a:pPr marL="285750" indent="-285750">
+              <a:buFontTx/>
+              <a:buChar char="-"/>
+            </a:pPr>
+            <a:r>
+              <a:rPr lang="en-US" altLang="ko-KR" sz="1600" dirty="0">
+                <a:ea typeface="맑은 고딕"/>
+              </a:rPr>
+              <a:t>Data:</a:t>
+            </a:r>
+            <a:r>
+              <a:rPr lang="ko-KR" altLang="en-US" sz="1600" dirty="0">
+                <a:ea typeface="맑은 고딕"/>
+              </a:rPr>
+              <a:t> </a:t>
+            </a:r>
+            <a:r>
+              <a:rPr lang="en-US" altLang="ko-KR" sz="1600" dirty="0">
+                <a:ea typeface="맑은 고딕"/>
+              </a:rPr>
+              <a:t>The academic family tree</a:t>
+            </a:r>
+          </a:p>
+          <a:p>
+            <a:pPr marL="742950" lvl="1" indent="-285750">
+              <a:buFont typeface="Arial" panose="020B0604020202020204" pitchFamily="34" charset="0"/>
+              <a:buChar char="•"/>
+            </a:pPr>
+            <a:r>
+              <a:rPr lang="en-US" altLang="ko-KR" sz="1600" dirty="0">
+                <a:ea typeface="맑은 고딕"/>
+              </a:rPr>
+              <a:t>As of 2015. The original data has 114,949 individuals with 484 Nobel Prize winners</a:t>
+            </a:r>
+          </a:p>
+          <a:p>
+            <a:pPr marL="742950" lvl="1" indent="-285750">
+              <a:buFont typeface="Arial" panose="020B0604020202020204" pitchFamily="34" charset="0"/>
+              <a:buChar char="•"/>
+            </a:pPr>
+            <a:endParaRPr lang="en-US" altLang="ko-KR" sz="1600" dirty="0">
+              <a:ea typeface="맑은 고딕"/>
+            </a:endParaRPr>
+          </a:p>
+          <a:p>
+            <a:pPr marL="742950" lvl="1" indent="-285750">
+              <a:buFont typeface="Arial" panose="020B0604020202020204" pitchFamily="34" charset="0"/>
+              <a:buChar char="•"/>
+            </a:pPr>
+            <a:r>
+              <a:rPr lang="en-US" altLang="ko-KR" sz="1600" dirty="0">
+                <a:ea typeface="맑은 고딕"/>
+              </a:rPr>
+              <a:t>The data was restricted to the strongly connected components with 57,831 individuals (402 Nobel laureates) </a:t>
+            </a:r>
+          </a:p>
+          <a:p>
+            <a:pPr marL="742950" lvl="1" indent="-285750">
+              <a:buFont typeface="Arial" panose="020B0604020202020204" pitchFamily="34" charset="0"/>
+              <a:buChar char="•"/>
+            </a:pPr>
+            <a:endParaRPr lang="en-US" altLang="ko-KR" sz="1600" dirty="0">
+              <a:ea typeface="맑은 고딕"/>
+            </a:endParaRPr>
+          </a:p>
+          <a:p>
+            <a:pPr marL="742950" lvl="1" indent="-285750">
+              <a:buFont typeface="Arial" panose="020B0604020202020204" pitchFamily="34" charset="0"/>
+              <a:buChar char="•"/>
+            </a:pPr>
+            <a:r>
+              <a:rPr lang="en-US" altLang="ko-KR" sz="1600" dirty="0">
+                <a:ea typeface="맑은 고딕"/>
+              </a:rPr>
+              <a:t>Focusing on chemistry, physics, physiology, medicine. Peace, economics, literature were not included.</a:t>
+            </a:r>
+          </a:p>
+          <a:p>
+            <a:endParaRPr lang="en-US" altLang="ko-KR" sz="1600" dirty="0">
+              <a:ea typeface="맑은 고딕"/>
+            </a:endParaRPr>
+          </a:p>
+          <a:p>
+            <a:pPr marL="285750" indent="-285750">
+              <a:buFontTx/>
+              <a:buChar char="-"/>
+            </a:pPr>
+            <a:r>
+              <a:rPr lang="en-US" altLang="ko-KR" sz="1600" dirty="0">
+                <a:ea typeface="맑은 고딕"/>
+              </a:rPr>
+              <a:t>Method</a:t>
+            </a:r>
+          </a:p>
+          <a:p>
+            <a:pPr marL="742950" lvl="1" indent="-285750">
+              <a:buFont typeface="Arial" panose="020B0604020202020204" pitchFamily="34" charset="0"/>
+              <a:buChar char="•"/>
+            </a:pPr>
+            <a:r>
+              <a:rPr lang="en-US" altLang="ko-KR" sz="1600" dirty="0">
+                <a:ea typeface="맑은 고딕"/>
+              </a:rPr>
+              <a:t>Rejected ERGM, community detection, and main path analysis</a:t>
+            </a:r>
+          </a:p>
+          <a:p>
+            <a:pPr marL="742950" lvl="1" indent="-285750">
+              <a:buFont typeface="Arial" panose="020B0604020202020204" pitchFamily="34" charset="0"/>
+              <a:buChar char="•"/>
+            </a:pPr>
+            <a:endParaRPr lang="en-US" altLang="ko-KR" sz="1600" dirty="0">
+              <a:ea typeface="맑은 고딕"/>
+            </a:endParaRPr>
+          </a:p>
+          <a:p>
+            <a:pPr marL="742950" lvl="1" indent="-285750">
+              <a:buFont typeface="Arial" panose="020B0604020202020204" pitchFamily="34" charset="0"/>
+              <a:buChar char="•"/>
+            </a:pPr>
+            <a:r>
+              <a:rPr lang="en-US" altLang="ko-KR" sz="1600" dirty="0">
+                <a:ea typeface="맑은 고딕"/>
+              </a:rPr>
+              <a:t>Random permutation using C++ to generate topologically same network to calculate p-value (did not fully understand it).</a:t>
+            </a:r>
+          </a:p>
+          <a:p>
+            <a:pPr lvl="1"/>
+            <a:endParaRPr lang="en-US" altLang="ko-KR" sz="1600" dirty="0">
+              <a:ea typeface="맑은 고딕"/>
+            </a:endParaRPr>
+          </a:p>
+          <a:p>
+            <a:pPr marL="742950" lvl="1" indent="-285750">
+              <a:buFont typeface="Arial" panose="020B0604020202020204" pitchFamily="34" charset="0"/>
+              <a:buChar char="•"/>
+            </a:pPr>
+            <a:r>
+              <a:rPr lang="en-US" altLang="ko-KR" sz="1600" dirty="0">
+                <a:ea typeface="맑은 고딕"/>
+              </a:rPr>
+              <a:t>Negative binomial regression + zero inflated model to take into account zero outcomes (of Nobel prize winners in a graph)</a:t>
+            </a:r>
+          </a:p>
+          <a:p>
+            <a:pPr lvl="1"/>
+            <a:endParaRPr lang="en-US" altLang="ko-KR" sz="1600" dirty="0">
+              <a:ea typeface="맑은 고딕"/>
+            </a:endParaRPr>
+          </a:p>
+          <a:p>
+            <a:pPr marL="742950" lvl="1" indent="-285750">
+              <a:buFont typeface="Arial" panose="020B0604020202020204" pitchFamily="34" charset="0"/>
+              <a:buChar char="•"/>
+            </a:pPr>
+            <a:endParaRPr lang="en-US" altLang="ko-KR" sz="1600" dirty="0">
+              <a:ea typeface="맑은 고딕"/>
+            </a:endParaRPr>
+          </a:p>
+          <a:p>
+            <a:pPr marL="742950" lvl="1" indent="-285750">
+              <a:buFont typeface="Arial" panose="020B0604020202020204" pitchFamily="34" charset="0"/>
+              <a:buChar char="•"/>
+            </a:pPr>
+            <a:endParaRPr lang="en-US" altLang="ko-KR" sz="1600" dirty="0">
+              <a:ea typeface="맑은 고딕"/>
+            </a:endParaRPr>
+          </a:p>
+          <a:p>
+            <a:pPr marL="742950" lvl="1" indent="-285750">
+              <a:buFont typeface="Arial" panose="020B0604020202020204" pitchFamily="34" charset="0"/>
+              <a:buChar char="•"/>
+            </a:pPr>
+            <a:endParaRPr lang="en-US" altLang="ko-KR" sz="1600" dirty="0">
+              <a:ea typeface="맑은 고딕"/>
+            </a:endParaRPr>
+          </a:p>
+          <a:p>
+            <a:r>
+              <a:rPr lang="en-US" altLang="ko-KR" sz="1600" dirty="0">
+                <a:ea typeface="맑은 고딕"/>
+              </a:rPr>
+              <a:t>	</a:t>
+            </a:r>
+          </a:p>
+        </p:txBody>
+      </p:sp>
+    </p:spTree>
+    <p:extLst>
+      <p:ext uri="{BB962C8B-B14F-4D97-AF65-F5344CB8AC3E}">
+        <p14:creationId xmlns:p14="http://schemas.microsoft.com/office/powerpoint/2010/main" val="969853647"/>
+      </p:ext>
+    </p:extLst>
+  </p:cSld>
+  <p:clrMapOvr>
+    <a:masterClrMapping/>
+  </p:clrMapOvr>
+</p:sld>
+</file>
+
+<file path=ppt/slides/slide9.xml><?xml version="1.0" encoding="utf-8"?>
+<p:sld xmlns:a="http://schemas.openxmlformats.org/drawingml/2006/main" xmlns:r="http://schemas.openxmlformats.org/officeDocument/2006/relationships" xmlns:p="http://schemas.openxmlformats.org/presentationml/2006/main">
+  <p:cSld>
+    <p:spTree>
+      <p:nvGrpSpPr>
+        <p:cNvPr id="1" name=""/>
+        <p:cNvGrpSpPr/>
+        <p:nvPr/>
+      </p:nvGrpSpPr>
+      <p:grpSpPr>
+        <a:xfrm>
+          <a:off x="0" y="0"/>
+          <a:ext cx="0" cy="0"/>
+          <a:chOff x="0" y="0"/>
+          <a:chExt cx="0" cy="0"/>
+        </a:xfrm>
+      </p:grpSpPr>
+      <p:sp>
+        <p:nvSpPr>
+          <p:cNvPr id="4" name="TextBox 3"/>
+          <p:cNvSpPr txBox="1"/>
+          <p:nvPr/>
+        </p:nvSpPr>
+        <p:spPr>
+          <a:xfrm>
+            <a:off x="863566" y="4259544"/>
+            <a:ext cx="7416868" cy="338554"/>
+          </a:xfrm>
+          <a:prstGeom prst="rect">
+            <a:avLst/>
+          </a:prstGeom>
+          <a:noFill/>
+        </p:spPr>
+        <p:txBody>
+          <a:bodyPr wrap="square" rtlCol="0" anchor="t">
+            <a:spAutoFit/>
+          </a:bodyPr>
+          <a:lstStyle/>
+          <a:p>
+            <a:pPr marL="285750" indent="-285750">
+              <a:buFontTx/>
+              <a:buChar char="-"/>
+            </a:pPr>
+            <a:endParaRPr lang="en-US" sz="1600" dirty="0">
+              <a:ea typeface="맑은 고딕"/>
+            </a:endParaRPr>
+          </a:p>
+        </p:txBody>
+      </p:sp>
+      <p:sp>
+        <p:nvSpPr>
+          <p:cNvPr id="2" name="직사각형 1"/>
+          <p:cNvSpPr/>
+          <p:nvPr/>
+        </p:nvSpPr>
+        <p:spPr>
+          <a:xfrm>
+            <a:off x="537437" y="6199832"/>
+            <a:ext cx="8580782" cy="415498"/>
+          </a:xfrm>
+          <a:prstGeom prst="rect">
+            <a:avLst/>
+          </a:prstGeom>
+        </p:spPr>
+        <p:txBody>
+          <a:bodyPr wrap="square" anchor="t">
+            <a:spAutoFit/>
+          </a:bodyPr>
+          <a:lstStyle/>
+          <a:p>
+            <a:r>
+              <a:rPr lang="en-US" sz="1050" dirty="0" err="1">
+                <a:latin typeface="Arial"/>
+                <a:cs typeface="Arial"/>
+              </a:rPr>
+              <a:t>Chariker</a:t>
+            </a:r>
+            <a:r>
+              <a:rPr lang="en-US" sz="1050" dirty="0">
+                <a:latin typeface="Arial"/>
+                <a:cs typeface="Arial"/>
+              </a:rPr>
+              <a:t>, Julia H., </a:t>
+            </a:r>
+            <a:r>
+              <a:rPr lang="en-US" sz="1050" dirty="0" err="1">
+                <a:latin typeface="Arial"/>
+                <a:cs typeface="Arial"/>
+              </a:rPr>
+              <a:t>Yihang</a:t>
+            </a:r>
+            <a:r>
+              <a:rPr lang="en-US" sz="1050" dirty="0">
+                <a:latin typeface="Arial"/>
+                <a:cs typeface="Arial"/>
+              </a:rPr>
+              <a:t> Zhang, John R. Pani, and Eric C. </a:t>
+            </a:r>
+            <a:r>
+              <a:rPr lang="en-US" sz="1050" dirty="0" err="1">
+                <a:latin typeface="Arial"/>
+                <a:cs typeface="Arial"/>
+              </a:rPr>
+              <a:t>Rouchka</a:t>
+            </a:r>
+            <a:r>
+              <a:rPr lang="en-US" sz="1050" dirty="0">
+                <a:latin typeface="Arial"/>
+                <a:cs typeface="Arial"/>
+              </a:rPr>
+              <a:t>. "Identification of successful mentoring communities using network-based analysis of mentor–mentee relationships across Nobel laureates." </a:t>
+            </a:r>
+            <a:r>
+              <a:rPr lang="en-US" sz="1050" i="1" dirty="0" err="1">
+                <a:latin typeface="Arial"/>
+                <a:cs typeface="Arial"/>
+              </a:rPr>
+              <a:t>Scientometrics</a:t>
+            </a:r>
+            <a:r>
+              <a:rPr lang="en-US" sz="1050" dirty="0">
+                <a:latin typeface="Arial"/>
+                <a:cs typeface="Arial"/>
+              </a:rPr>
+              <a:t> 111, no. 3 (2017): 1733-1749.</a:t>
+            </a:r>
+            <a:endParaRPr lang="ko-KR" dirty="0"/>
+          </a:p>
+        </p:txBody>
+      </p:sp>
+      <p:sp>
+        <p:nvSpPr>
+          <p:cNvPr id="5" name="TextBox 4">
+            <a:extLst>
+              <a:ext uri="{FF2B5EF4-FFF2-40B4-BE49-F238E27FC236}">
+                <a16:creationId xmlns:a16="http://schemas.microsoft.com/office/drawing/2014/main" id="{9284D01B-CBC3-43FE-9A5E-6C45C0CA2498}"/>
+              </a:ext>
+            </a:extLst>
+          </p:cNvPr>
+          <p:cNvSpPr txBox="1"/>
+          <p:nvPr/>
+        </p:nvSpPr>
+        <p:spPr>
+          <a:xfrm>
+            <a:off x="863566" y="464945"/>
+            <a:ext cx="7275882" cy="2062103"/>
+          </a:xfrm>
+          <a:prstGeom prst="rect">
+            <a:avLst/>
+          </a:prstGeom>
+        </p:spPr>
+        <p:txBody>
+          <a:bodyPr rot="0" spcFirstLastPara="0" vertOverflow="overflow" horzOverflow="overflow" vert="horz" wrap="square" lIns="91440" tIns="45720" rIns="91440" bIns="45720" numCol="1" spcCol="0" rtlCol="0" fromWordArt="0" anchor="t" anchorCtr="0" forceAA="0" compatLnSpc="1">
+            <a:prstTxWarp prst="textNoShape">
+              <a:avLst/>
+            </a:prstTxWarp>
+            <a:spAutoFit/>
+          </a:bodyPr>
+          <a:lstStyle/>
+          <a:p>
+            <a:pPr marL="285750" indent="-285750">
+              <a:buFontTx/>
+              <a:buChar char="-"/>
+            </a:pPr>
+            <a:r>
+              <a:rPr lang="en-US" altLang="ko-KR" sz="1600" dirty="0">
+                <a:ea typeface="맑은 고딕"/>
+              </a:rPr>
+              <a:t>For visualization, the network was again restricted to the individuals who have more or equal to 4 prize winners in their family trees and at least 1 Nobel laureate descendants (the 99</a:t>
+            </a:r>
+            <a:r>
+              <a:rPr lang="en-US" altLang="ko-KR" sz="1600" baseline="30000" dirty="0">
+                <a:ea typeface="맑은 고딕"/>
+              </a:rPr>
+              <a:t>th</a:t>
+            </a:r>
+            <a:r>
+              <a:rPr lang="en-US" altLang="ko-KR" sz="1600" dirty="0">
+                <a:ea typeface="맑은 고딕"/>
+              </a:rPr>
+              <a:t> percent quantile) </a:t>
+            </a:r>
+          </a:p>
+          <a:p>
+            <a:pPr lvl="1"/>
+            <a:endParaRPr lang="en-US" altLang="ko-KR" sz="1600" dirty="0">
+              <a:ea typeface="맑은 고딕"/>
+            </a:endParaRPr>
+          </a:p>
+          <a:p>
+            <a:pPr marL="742950" lvl="1" indent="-285750">
+              <a:buFont typeface="Arial" panose="020B0604020202020204" pitchFamily="34" charset="0"/>
+              <a:buChar char="•"/>
+            </a:pPr>
+            <a:endParaRPr lang="en-US" altLang="ko-KR" sz="1600" dirty="0">
+              <a:ea typeface="맑은 고딕"/>
+            </a:endParaRPr>
+          </a:p>
+          <a:p>
+            <a:pPr marL="742950" lvl="1" indent="-285750">
+              <a:buFont typeface="Arial" panose="020B0604020202020204" pitchFamily="34" charset="0"/>
+              <a:buChar char="•"/>
+            </a:pPr>
+            <a:endParaRPr lang="en-US" altLang="ko-KR" sz="1600" dirty="0">
+              <a:ea typeface="맑은 고딕"/>
+            </a:endParaRPr>
+          </a:p>
+          <a:p>
+            <a:pPr marL="742950" lvl="1" indent="-285750">
+              <a:buFont typeface="Arial" panose="020B0604020202020204" pitchFamily="34" charset="0"/>
+              <a:buChar char="•"/>
+            </a:pPr>
+            <a:endParaRPr lang="en-US" altLang="ko-KR" sz="1600" dirty="0">
+              <a:ea typeface="맑은 고딕"/>
+            </a:endParaRPr>
+          </a:p>
+          <a:p>
+            <a:r>
+              <a:rPr lang="en-US" altLang="ko-KR" sz="1600" dirty="0">
+                <a:ea typeface="맑은 고딕"/>
+              </a:rPr>
+              <a:t>	</a:t>
+            </a:r>
           </a:p>
         </p:txBody>
       </p:sp>
       <p:pic>
         <p:nvPicPr>
-          <p:cNvPr id="5" name="그림 5">
+          <p:cNvPr id="3" name="그림 2">
             <a:extLst>
               <a:ext uri="{FF2B5EF4-FFF2-40B4-BE49-F238E27FC236}">
-                <a16:creationId xmlns:a16="http://schemas.microsoft.com/office/drawing/2014/main" id="{7C8E00FC-F77E-478F-9802-55B3B4036D15}"/>
+                <a16:creationId xmlns:a16="http://schemas.microsoft.com/office/drawing/2014/main" id="{59805DF2-FB11-4815-8D25-156BD404ACB5}"/>
               </a:ext>
             </a:extLst>
           </p:cNvPr>
@@ -4797,18 +5578,23 @@
         </p:blipFill>
         <p:spPr>
           <a:xfrm>
-            <a:off x="1365837" y="1263154"/>
-            <a:ext cx="6181805" cy="1911219"/>
+            <a:off x="1357246" y="1495996"/>
+            <a:ext cx="6782202" cy="3374017"/>
           </a:xfrm>
           <a:prstGeom prst="rect">
             <a:avLst/>
           </a:prstGeom>
+          <a:ln>
+            <a:solidFill>
+              <a:schemeClr val="tx1"/>
+            </a:solidFill>
+          </a:ln>
         </p:spPr>
       </p:pic>
     </p:spTree>
     <p:extLst>
       <p:ext uri="{BB962C8B-B14F-4D97-AF65-F5344CB8AC3E}">
-        <p14:creationId xmlns:p14="http://schemas.microsoft.com/office/powerpoint/2010/main" val="784926822"/>
+        <p14:creationId xmlns:p14="http://schemas.microsoft.com/office/powerpoint/2010/main" val="3270501208"/>
       </p:ext>
     </p:extLst>
   </p:cSld>

</xml_diff>